<commit_message>
NServiceBus code and presentations
</commit_message>
<xml_diff>
--- a/Slides/EF/4 - Code First.pptx
+++ b/Slides/EF/4 - Code First.pptx
@@ -3270,29 +3270,6 @@
           </a:p>
         </p:txBody>
       </p:sp>
-      <p:sp>
-        <p:nvSpPr>
-          <p:cNvPr id="4" name="Footer Placeholder 3"/>
-          <p:cNvSpPr>
-            <a:spLocks noGrp="1"/>
-          </p:cNvSpPr>
-          <p:nvPr>
-            <p:ph type="ftr" sz="quarter" idx="11"/>
-          </p:nvPr>
-        </p:nvSpPr>
-        <p:spPr/>
-        <p:txBody>
-          <a:bodyPr/>
-          <a:lstStyle/>
-          <a:p>
-            <a:r>
-              <a:rPr lang="en-US" smtClean="0"/>
-              <a:t>Syed Awn Ali</a:t>
-            </a:r>
-            <a:endParaRPr lang="en-US"/>
-          </a:p>
-        </p:txBody>
-      </p:sp>
     </p:spTree>
     <p:extLst>
       <p:ext uri="{BB962C8B-B14F-4D97-AF65-F5344CB8AC3E}">
@@ -3526,29 +3503,6 @@
           </a:extLst>
         </p:spPr>
       </p:pic>
-      <p:sp>
-        <p:nvSpPr>
-          <p:cNvPr id="4" name="Footer Placeholder 3"/>
-          <p:cNvSpPr>
-            <a:spLocks noGrp="1"/>
-          </p:cNvSpPr>
-          <p:nvPr>
-            <p:ph type="ftr" sz="quarter" idx="11"/>
-          </p:nvPr>
-        </p:nvSpPr>
-        <p:spPr/>
-        <p:txBody>
-          <a:bodyPr/>
-          <a:lstStyle/>
-          <a:p>
-            <a:r>
-              <a:rPr lang="en-US" smtClean="0"/>
-              <a:t>Syed Awn Ali</a:t>
-            </a:r>
-            <a:endParaRPr lang="en-US"/>
-          </a:p>
-        </p:txBody>
-      </p:sp>
     </p:spTree>
     <p:extLst>
       <p:ext uri="{BB962C8B-B14F-4D97-AF65-F5344CB8AC3E}">
@@ -3712,29 +3666,6 @@
           </a:extLst>
         </p:spPr>
       </p:pic>
-      <p:sp>
-        <p:nvSpPr>
-          <p:cNvPr id="4" name="Footer Placeholder 3"/>
-          <p:cNvSpPr>
-            <a:spLocks noGrp="1"/>
-          </p:cNvSpPr>
-          <p:nvPr>
-            <p:ph type="ftr" sz="quarter" idx="11"/>
-          </p:nvPr>
-        </p:nvSpPr>
-        <p:spPr/>
-        <p:txBody>
-          <a:bodyPr/>
-          <a:lstStyle/>
-          <a:p>
-            <a:r>
-              <a:rPr lang="en-US" smtClean="0"/>
-              <a:t>Syed Awn Ali</a:t>
-            </a:r>
-            <a:endParaRPr lang="en-US"/>
-          </a:p>
-        </p:txBody>
-      </p:sp>
     </p:spTree>
     <p:extLst>
       <p:ext uri="{BB962C8B-B14F-4D97-AF65-F5344CB8AC3E}">
@@ -3846,29 +3777,6 @@
           </a:p>
         </p:txBody>
       </p:sp>
-      <p:sp>
-        <p:nvSpPr>
-          <p:cNvPr id="4" name="Footer Placeholder 3"/>
-          <p:cNvSpPr>
-            <a:spLocks noGrp="1"/>
-          </p:cNvSpPr>
-          <p:nvPr>
-            <p:ph type="ftr" sz="quarter" idx="11"/>
-          </p:nvPr>
-        </p:nvSpPr>
-        <p:spPr/>
-        <p:txBody>
-          <a:bodyPr/>
-          <a:lstStyle/>
-          <a:p>
-            <a:r>
-              <a:rPr lang="en-US" smtClean="0"/>
-              <a:t>Syed Awn Ali</a:t>
-            </a:r>
-            <a:endParaRPr lang="en-US"/>
-          </a:p>
-        </p:txBody>
-      </p:sp>
     </p:spTree>
     <p:extLst>
       <p:ext uri="{BB962C8B-B14F-4D97-AF65-F5344CB8AC3E}">
@@ -4011,29 +3919,6 @@
               <a:rPr lang="en-US" dirty="0"/>
               <a:t> then you have to use Fluent API</a:t>
             </a:r>
-          </a:p>
-        </p:txBody>
-      </p:sp>
-      <p:sp>
-        <p:nvSpPr>
-          <p:cNvPr id="4" name="Footer Placeholder 3"/>
-          <p:cNvSpPr>
-            <a:spLocks noGrp="1"/>
-          </p:cNvSpPr>
-          <p:nvPr>
-            <p:ph type="ftr" sz="quarter" idx="11"/>
-          </p:nvPr>
-        </p:nvSpPr>
-        <p:spPr/>
-        <p:txBody>
-          <a:bodyPr/>
-          <a:lstStyle/>
-          <a:p>
-            <a:r>
-              <a:rPr lang="en-US" smtClean="0"/>
-              <a:t>Syed Awn Ali</a:t>
-            </a:r>
-            <a:endParaRPr lang="en-US"/>
           </a:p>
         </p:txBody>
       </p:sp>
@@ -4393,29 +4278,6 @@
           </a:extLst>
         </p:spPr>
       </p:pic>
-      <p:sp>
-        <p:nvSpPr>
-          <p:cNvPr id="4" name="Footer Placeholder 3"/>
-          <p:cNvSpPr>
-            <a:spLocks noGrp="1"/>
-          </p:cNvSpPr>
-          <p:nvPr>
-            <p:ph type="ftr" sz="quarter" idx="11"/>
-          </p:nvPr>
-        </p:nvSpPr>
-        <p:spPr/>
-        <p:txBody>
-          <a:bodyPr/>
-          <a:lstStyle/>
-          <a:p>
-            <a:r>
-              <a:rPr lang="en-US" smtClean="0"/>
-              <a:t>Syed Awn Ali</a:t>
-            </a:r>
-            <a:endParaRPr lang="en-US"/>
-          </a:p>
-        </p:txBody>
-      </p:sp>
     </p:spTree>
     <p:extLst>
       <p:ext uri="{BB962C8B-B14F-4D97-AF65-F5344CB8AC3E}">
@@ -4569,29 +4431,6 @@
           </a:extLst>
         </p:spPr>
       </p:pic>
-      <p:sp>
-        <p:nvSpPr>
-          <p:cNvPr id="4" name="Footer Placeholder 3"/>
-          <p:cNvSpPr>
-            <a:spLocks noGrp="1"/>
-          </p:cNvSpPr>
-          <p:nvPr>
-            <p:ph type="ftr" sz="quarter" idx="11"/>
-          </p:nvPr>
-        </p:nvSpPr>
-        <p:spPr/>
-        <p:txBody>
-          <a:bodyPr/>
-          <a:lstStyle/>
-          <a:p>
-            <a:r>
-              <a:rPr lang="en-US" smtClean="0"/>
-              <a:t>Syed Awn Ali</a:t>
-            </a:r>
-            <a:endParaRPr lang="en-US"/>
-          </a:p>
-        </p:txBody>
-      </p:sp>
     </p:spTree>
     <p:extLst>
       <p:ext uri="{BB962C8B-B14F-4D97-AF65-F5344CB8AC3E}">
@@ -4728,7 +4567,6 @@
               <a:rPr lang="en-US" dirty="0" smtClean="0"/>
               <a:t>Called after model initialized but before it is locked down</a:t>
             </a:r>
-            <a:endParaRPr lang="en-US" dirty="0" smtClean="0"/>
           </a:p>
           <a:p>
             <a:endParaRPr lang="en-US" dirty="0"/>
@@ -5169,29 +5007,6 @@
           </a:extLst>
         </p:spPr>
       </p:pic>
-      <p:sp>
-        <p:nvSpPr>
-          <p:cNvPr id="4" name="Footer Placeholder 3"/>
-          <p:cNvSpPr>
-            <a:spLocks noGrp="1"/>
-          </p:cNvSpPr>
-          <p:nvPr>
-            <p:ph type="ftr" sz="quarter" idx="11"/>
-          </p:nvPr>
-        </p:nvSpPr>
-        <p:spPr/>
-        <p:txBody>
-          <a:bodyPr/>
-          <a:lstStyle/>
-          <a:p>
-            <a:r>
-              <a:rPr lang="en-US" smtClean="0"/>
-              <a:t>Syed Awn Ali</a:t>
-            </a:r>
-            <a:endParaRPr lang="en-US"/>
-          </a:p>
-        </p:txBody>
-      </p:sp>
     </p:spTree>
     <p:extLst>
       <p:ext uri="{BB962C8B-B14F-4D97-AF65-F5344CB8AC3E}">
@@ -5346,29 +5161,6 @@
           </a:extLst>
         </p:spPr>
       </p:pic>
-      <p:sp>
-        <p:nvSpPr>
-          <p:cNvPr id="4" name="Footer Placeholder 3"/>
-          <p:cNvSpPr>
-            <a:spLocks noGrp="1"/>
-          </p:cNvSpPr>
-          <p:nvPr>
-            <p:ph type="ftr" sz="quarter" idx="11"/>
-          </p:nvPr>
-        </p:nvSpPr>
-        <p:spPr/>
-        <p:txBody>
-          <a:bodyPr/>
-          <a:lstStyle/>
-          <a:p>
-            <a:r>
-              <a:rPr lang="en-US" smtClean="0"/>
-              <a:t>Syed Awn Ali</a:t>
-            </a:r>
-            <a:endParaRPr lang="en-US"/>
-          </a:p>
-        </p:txBody>
-      </p:sp>
     </p:spTree>
     <p:extLst>
       <p:ext uri="{BB962C8B-B14F-4D97-AF65-F5344CB8AC3E}">
@@ -5774,29 +5566,6 @@
           </a:p>
         </p:txBody>
       </p:sp>
-      <p:sp>
-        <p:nvSpPr>
-          <p:cNvPr id="4" name="Footer Placeholder 3"/>
-          <p:cNvSpPr>
-            <a:spLocks noGrp="1"/>
-          </p:cNvSpPr>
-          <p:nvPr>
-            <p:ph type="ftr" sz="quarter" idx="11"/>
-          </p:nvPr>
-        </p:nvSpPr>
-        <p:spPr/>
-        <p:txBody>
-          <a:bodyPr/>
-          <a:lstStyle/>
-          <a:p>
-            <a:r>
-              <a:rPr lang="en-US" smtClean="0"/>
-              <a:t>Syed Awn Ali</a:t>
-            </a:r>
-            <a:endParaRPr lang="en-US"/>
-          </a:p>
-        </p:txBody>
-      </p:sp>
     </p:spTree>
     <p:extLst>
       <p:ext uri="{BB962C8B-B14F-4D97-AF65-F5344CB8AC3E}">
@@ -5930,11 +5699,7 @@
             </a:pPr>
             <a:r>
               <a:rPr lang="en-US" dirty="0" smtClean="0"/>
-              <a:t>Command: </a:t>
-            </a:r>
-            <a:r>
-              <a:rPr lang="en-US" dirty="0" smtClean="0"/>
-              <a:t>enable-migrations </a:t>
+              <a:t>Command: enable-migrations </a:t>
             </a:r>
             <a:r>
               <a:rPr lang="en-US" dirty="0"/>
@@ -6186,29 +5951,6 @@
           </a:extLst>
         </p:spPr>
       </p:pic>
-      <p:sp>
-        <p:nvSpPr>
-          <p:cNvPr id="4" name="Footer Placeholder 3"/>
-          <p:cNvSpPr>
-            <a:spLocks noGrp="1"/>
-          </p:cNvSpPr>
-          <p:nvPr>
-            <p:ph type="ftr" sz="quarter" idx="11"/>
-          </p:nvPr>
-        </p:nvSpPr>
-        <p:spPr/>
-        <p:txBody>
-          <a:bodyPr/>
-          <a:lstStyle/>
-          <a:p>
-            <a:r>
-              <a:rPr lang="en-US" smtClean="0"/>
-              <a:t>Syed Awn Ali</a:t>
-            </a:r>
-            <a:endParaRPr lang="en-US"/>
-          </a:p>
-        </p:txBody>
-      </p:sp>
     </p:spTree>
     <p:extLst>
       <p:ext uri="{BB962C8B-B14F-4D97-AF65-F5344CB8AC3E}">
@@ -6623,29 +6365,6 @@
           </a:p>
         </p:txBody>
       </p:sp>
-      <p:sp>
-        <p:nvSpPr>
-          <p:cNvPr id="4" name="Footer Placeholder 3"/>
-          <p:cNvSpPr>
-            <a:spLocks noGrp="1"/>
-          </p:cNvSpPr>
-          <p:nvPr>
-            <p:ph type="ftr" sz="quarter" idx="11"/>
-          </p:nvPr>
-        </p:nvSpPr>
-        <p:spPr/>
-        <p:txBody>
-          <a:bodyPr/>
-          <a:lstStyle/>
-          <a:p>
-            <a:r>
-              <a:rPr lang="en-US" smtClean="0"/>
-              <a:t>Syed Awn Ali</a:t>
-            </a:r>
-            <a:endParaRPr lang="en-US"/>
-          </a:p>
-        </p:txBody>
-      </p:sp>
     </p:spTree>
     <p:extLst>
       <p:ext uri="{BB962C8B-B14F-4D97-AF65-F5344CB8AC3E}">
@@ -7248,29 +6967,6 @@
           <a:p>
             <a:pPr lvl="1"/>
             <a:endParaRPr lang="en-US" dirty="0"/>
-          </a:p>
-        </p:txBody>
-      </p:sp>
-      <p:sp>
-        <p:nvSpPr>
-          <p:cNvPr id="4" name="Footer Placeholder 3"/>
-          <p:cNvSpPr>
-            <a:spLocks noGrp="1"/>
-          </p:cNvSpPr>
-          <p:nvPr>
-            <p:ph type="ftr" sz="quarter" idx="11"/>
-          </p:nvPr>
-        </p:nvSpPr>
-        <p:spPr/>
-        <p:txBody>
-          <a:bodyPr/>
-          <a:lstStyle/>
-          <a:p>
-            <a:r>
-              <a:rPr lang="en-US" smtClean="0"/>
-              <a:t>Syed Awn Ali</a:t>
-            </a:r>
-            <a:endParaRPr lang="en-US"/>
           </a:p>
         </p:txBody>
       </p:sp>
@@ -7533,29 +7229,6 @@
           </a:p>
         </p:txBody>
       </p:sp>
-      <p:sp>
-        <p:nvSpPr>
-          <p:cNvPr id="4" name="Footer Placeholder 3"/>
-          <p:cNvSpPr>
-            <a:spLocks noGrp="1"/>
-          </p:cNvSpPr>
-          <p:nvPr>
-            <p:ph type="ftr" sz="quarter" idx="11"/>
-          </p:nvPr>
-        </p:nvSpPr>
-        <p:spPr/>
-        <p:txBody>
-          <a:bodyPr/>
-          <a:lstStyle/>
-          <a:p>
-            <a:r>
-              <a:rPr lang="en-US" smtClean="0"/>
-              <a:t>Syed Awn Ali</a:t>
-            </a:r>
-            <a:endParaRPr lang="en-US"/>
-          </a:p>
-        </p:txBody>
-      </p:sp>
       <p:pic>
         <p:nvPicPr>
           <p:cNvPr id="6" name="Picture 5"/>
@@ -7659,7 +7332,6 @@
               <a:rPr lang="en-US" dirty="0" smtClean="0"/>
               <a:t>Use a name in the base initializer:</a:t>
             </a:r>
-            <a:endParaRPr lang="en-US" dirty="0" smtClean="0"/>
           </a:p>
           <a:p>
             <a:pPr lvl="1"/>
@@ -7684,29 +7356,6 @@
               <a:t>name</a:t>
             </a:r>
             <a:endParaRPr lang="en-US" dirty="0"/>
-          </a:p>
-        </p:txBody>
-      </p:sp>
-      <p:sp>
-        <p:nvSpPr>
-          <p:cNvPr id="4" name="Footer Placeholder 3"/>
-          <p:cNvSpPr>
-            <a:spLocks noGrp="1"/>
-          </p:cNvSpPr>
-          <p:nvPr>
-            <p:ph type="ftr" sz="quarter" idx="11"/>
-          </p:nvPr>
-        </p:nvSpPr>
-        <p:spPr/>
-        <p:txBody>
-          <a:bodyPr/>
-          <a:lstStyle/>
-          <a:p>
-            <a:r>
-              <a:rPr lang="en-US" smtClean="0"/>
-              <a:t>Syed Awn Ali</a:t>
-            </a:r>
-            <a:endParaRPr lang="en-US"/>
           </a:p>
         </p:txBody>
       </p:sp>
@@ -7899,29 +7548,6 @@
           </a:extLst>
         </p:spPr>
       </p:pic>
-      <p:sp>
-        <p:nvSpPr>
-          <p:cNvPr id="4" name="Footer Placeholder 3"/>
-          <p:cNvSpPr>
-            <a:spLocks noGrp="1"/>
-          </p:cNvSpPr>
-          <p:nvPr>
-            <p:ph type="ftr" sz="quarter" idx="11"/>
-          </p:nvPr>
-        </p:nvSpPr>
-        <p:spPr/>
-        <p:txBody>
-          <a:bodyPr/>
-          <a:lstStyle/>
-          <a:p>
-            <a:r>
-              <a:rPr lang="en-US" smtClean="0"/>
-              <a:t>Syed Awn Ali</a:t>
-            </a:r>
-            <a:endParaRPr lang="en-US"/>
-          </a:p>
-        </p:txBody>
-      </p:sp>
     </p:spTree>
     <p:extLst>
       <p:ext uri="{BB962C8B-B14F-4D97-AF65-F5344CB8AC3E}">

</xml_diff>